<commit_message>
added additional lines, switch to Schadenmühle
</commit_message>
<xml_diff>
--- a/images/src.pptx
+++ b/images/src.pptx
@@ -5274,6 +5274,287 @@
                 <a:cs typeface="Arial" panose="020B0604020202020204" pitchFamily="34" charset="0"/>
               </a:rPr>
               <a:t>S19</a:t>
+            </a:r>
+          </a:p>
+        </p:txBody>
+      </p:sp>
+      <p:pic>
+        <p:nvPicPr>
+          <p:cNvPr id="11" name="Picture 4">
+            <a:extLst>
+              <a:ext uri="{FF2B5EF4-FFF2-40B4-BE49-F238E27FC236}">
+                <a16:creationId xmlns:a16="http://schemas.microsoft.com/office/drawing/2014/main" id="{DE4BDE86-C749-A4DA-E9B0-14251795EF6C}"/>
+              </a:ext>
+            </a:extLst>
+          </p:cNvPr>
+          <p:cNvPicPr>
+            <a:picLocks noChangeAspect="1" noChangeArrowheads="1"/>
+          </p:cNvPicPr>
+          <p:nvPr/>
+        </p:nvPicPr>
+        <p:blipFill>
+          <a:blip r:embed="rId6">
+            <a:extLst>
+              <a:ext uri="{28A0092B-C50C-407E-A947-70E740481C1C}">
+                <a14:useLocalDpi xmlns:a14="http://schemas.microsoft.com/office/drawing/2010/main" val="0"/>
+              </a:ext>
+            </a:extLst>
+          </a:blip>
+          <a:srcRect/>
+          <a:stretch/>
+        </p:blipFill>
+        <p:spPr bwMode="auto">
+          <a:xfrm>
+            <a:off x="8275045" y="5497345"/>
+            <a:ext cx="720000" cy="720000"/>
+          </a:xfrm>
+          <a:prstGeom prst="rect">
+            <a:avLst/>
+          </a:prstGeom>
+          <a:noFill/>
+          <a:extLst>
+            <a:ext uri="{909E8E84-426E-40DD-AFC4-6F175D3DCCD1}">
+              <a14:hiddenFill xmlns:a14="http://schemas.microsoft.com/office/drawing/2010/main">
+                <a:solidFill>
+                  <a:srgbClr val="FFFFFF"/>
+                </a:solidFill>
+              </a14:hiddenFill>
+            </a:ext>
+          </a:extLst>
+        </p:spPr>
+      </p:pic>
+      <p:sp>
+        <p:nvSpPr>
+          <p:cNvPr id="15" name="Rechteck: abgerundete Ecken 14">
+            <a:extLst>
+              <a:ext uri="{FF2B5EF4-FFF2-40B4-BE49-F238E27FC236}">
+                <a16:creationId xmlns:a16="http://schemas.microsoft.com/office/drawing/2014/main" id="{AAA235A7-D4EE-B4BA-3BC9-9300FED69040}"/>
+              </a:ext>
+            </a:extLst>
+          </p:cNvPr>
+          <p:cNvSpPr/>
+          <p:nvPr/>
+        </p:nvSpPr>
+        <p:spPr>
+          <a:xfrm>
+            <a:off x="9122695" y="5497345"/>
+            <a:ext cx="2160000" cy="720000"/>
+          </a:xfrm>
+          <a:prstGeom prst="roundRect">
+            <a:avLst/>
+          </a:prstGeom>
+          <a:solidFill>
+            <a:schemeClr val="accent5">
+              <a:lumMod val="60000"/>
+              <a:lumOff val="40000"/>
+            </a:schemeClr>
+          </a:solidFill>
+          <a:ln>
+            <a:noFill/>
+          </a:ln>
+        </p:spPr>
+        <p:style>
+          <a:lnRef idx="2">
+            <a:schemeClr val="accent1">
+              <a:shade val="15000"/>
+            </a:schemeClr>
+          </a:lnRef>
+          <a:fillRef idx="1">
+            <a:schemeClr val="accent1"/>
+          </a:fillRef>
+          <a:effectRef idx="0">
+            <a:schemeClr val="accent1"/>
+          </a:effectRef>
+          <a:fontRef idx="minor">
+            <a:schemeClr val="lt1"/>
+          </a:fontRef>
+        </p:style>
+        <p:txBody>
+          <a:bodyPr rtlCol="0" anchor="ctr"/>
+          <a:lstStyle/>
+          <a:p>
+            <a:pPr algn="ctr"/>
+            <a:endParaRPr lang="de-CH" dirty="0"/>
+          </a:p>
+        </p:txBody>
+      </p:sp>
+      <p:sp>
+        <p:nvSpPr>
+          <p:cNvPr id="16" name="Textfeld 15">
+            <a:extLst>
+              <a:ext uri="{FF2B5EF4-FFF2-40B4-BE49-F238E27FC236}">
+                <a16:creationId xmlns:a16="http://schemas.microsoft.com/office/drawing/2014/main" id="{8DC1DB20-FA17-376E-CAA5-C1F1CA5AC4CA}"/>
+              </a:ext>
+            </a:extLst>
+          </p:cNvPr>
+          <p:cNvSpPr txBox="1"/>
+          <p:nvPr/>
+        </p:nvSpPr>
+        <p:spPr>
+          <a:xfrm>
+            <a:off x="9918001" y="5399715"/>
+            <a:ext cx="569387" cy="923330"/>
+          </a:xfrm>
+          <a:prstGeom prst="rect">
+            <a:avLst/>
+          </a:prstGeom>
+          <a:noFill/>
+        </p:spPr>
+        <p:txBody>
+          <a:bodyPr wrap="none" rtlCol="0">
+            <a:spAutoFit/>
+          </a:bodyPr>
+          <a:lstStyle/>
+          <a:p>
+            <a:r>
+              <a:rPr lang="de-CH" sz="5400" b="1" dirty="0">
+                <a:solidFill>
+                  <a:schemeClr val="bg1"/>
+                </a:solidFill>
+                <a:latin typeface="Arial" panose="020B0604020202020204" pitchFamily="34" charset="0"/>
+                <a:cs typeface="Arial" panose="020B0604020202020204" pitchFamily="34" charset="0"/>
+              </a:rPr>
+              <a:t>2</a:t>
+            </a:r>
+          </a:p>
+        </p:txBody>
+      </p:sp>
+      <p:pic>
+        <p:nvPicPr>
+          <p:cNvPr id="45" name="Picture 2" descr="A century of design on the move - SWI swissinfo.ch">
+            <a:extLst>
+              <a:ext uri="{FF2B5EF4-FFF2-40B4-BE49-F238E27FC236}">
+                <a16:creationId xmlns:a16="http://schemas.microsoft.com/office/drawing/2014/main" id="{5C703251-195D-73C4-B713-633AE8E0B6C0}"/>
+              </a:ext>
+            </a:extLst>
+          </p:cNvPr>
+          <p:cNvPicPr>
+            <a:picLocks noChangeAspect="1" noChangeArrowheads="1"/>
+          </p:cNvPicPr>
+          <p:nvPr/>
+        </p:nvPicPr>
+        <p:blipFill>
+          <a:blip r:embed="rId5">
+            <a:extLst>
+              <a:ext uri="{28A0092B-C50C-407E-A947-70E740481C1C}">
+                <a14:useLocalDpi xmlns:a14="http://schemas.microsoft.com/office/drawing/2010/main" val="0"/>
+              </a:ext>
+            </a:extLst>
+          </a:blip>
+          <a:srcRect/>
+          <a:stretch>
+            <a:fillRect/>
+          </a:stretch>
+        </p:blipFill>
+        <p:spPr bwMode="auto">
+          <a:xfrm>
+            <a:off x="8507762" y="387962"/>
+            <a:ext cx="720000" cy="720000"/>
+          </a:xfrm>
+          <a:prstGeom prst="rect">
+            <a:avLst/>
+          </a:prstGeom>
+          <a:noFill/>
+          <a:extLst>
+            <a:ext uri="{909E8E84-426E-40DD-AFC4-6F175D3DCCD1}">
+              <a14:hiddenFill xmlns:a14="http://schemas.microsoft.com/office/drawing/2010/main">
+                <a:solidFill>
+                  <a:srgbClr val="FFFFFF"/>
+                </a:solidFill>
+              </a14:hiddenFill>
+            </a:ext>
+          </a:extLst>
+        </p:spPr>
+      </p:pic>
+      <p:sp>
+        <p:nvSpPr>
+          <p:cNvPr id="46" name="Rechteck: abgerundete Ecken 45">
+            <a:extLst>
+              <a:ext uri="{FF2B5EF4-FFF2-40B4-BE49-F238E27FC236}">
+                <a16:creationId xmlns:a16="http://schemas.microsoft.com/office/drawing/2014/main" id="{46B2FEB4-E123-5F7A-85A2-1FB749441A0A}"/>
+              </a:ext>
+            </a:extLst>
+          </p:cNvPr>
+          <p:cNvSpPr/>
+          <p:nvPr/>
+        </p:nvSpPr>
+        <p:spPr>
+          <a:xfrm>
+            <a:off x="9355412" y="387962"/>
+            <a:ext cx="2160000" cy="720000"/>
+          </a:xfrm>
+          <a:prstGeom prst="roundRect">
+            <a:avLst/>
+          </a:prstGeom>
+          <a:solidFill>
+            <a:srgbClr val="0F3B86"/>
+          </a:solidFill>
+          <a:ln>
+            <a:noFill/>
+          </a:ln>
+        </p:spPr>
+        <p:style>
+          <a:lnRef idx="2">
+            <a:schemeClr val="accent1">
+              <a:shade val="15000"/>
+            </a:schemeClr>
+          </a:lnRef>
+          <a:fillRef idx="1">
+            <a:schemeClr val="accent1"/>
+          </a:fillRef>
+          <a:effectRef idx="0">
+            <a:schemeClr val="accent1"/>
+          </a:effectRef>
+          <a:fontRef idx="minor">
+            <a:schemeClr val="lt1"/>
+          </a:fontRef>
+        </p:style>
+        <p:txBody>
+          <a:bodyPr rtlCol="0" anchor="ctr"/>
+          <a:lstStyle/>
+          <a:p>
+            <a:pPr algn="ctr"/>
+            <a:endParaRPr lang="de-CH" dirty="0"/>
+          </a:p>
+        </p:txBody>
+      </p:sp>
+      <p:sp>
+        <p:nvSpPr>
+          <p:cNvPr id="47" name="Textfeld 46">
+            <a:extLst>
+              <a:ext uri="{FF2B5EF4-FFF2-40B4-BE49-F238E27FC236}">
+                <a16:creationId xmlns:a16="http://schemas.microsoft.com/office/drawing/2014/main" id="{5C9BAD00-433B-368E-C23B-7C48B291A170}"/>
+              </a:ext>
+            </a:extLst>
+          </p:cNvPr>
+          <p:cNvSpPr txBox="1"/>
+          <p:nvPr/>
+        </p:nvSpPr>
+        <p:spPr>
+          <a:xfrm>
+            <a:off x="9859475" y="285234"/>
+            <a:ext cx="1146468" cy="923330"/>
+          </a:xfrm>
+          <a:prstGeom prst="rect">
+            <a:avLst/>
+          </a:prstGeom>
+          <a:noFill/>
+        </p:spPr>
+        <p:txBody>
+          <a:bodyPr wrap="none" rtlCol="0">
+            <a:spAutoFit/>
+          </a:bodyPr>
+          <a:lstStyle/>
+          <a:p>
+            <a:r>
+              <a:rPr lang="de-CH" sz="5400" b="1" dirty="0">
+                <a:solidFill>
+                  <a:schemeClr val="bg1"/>
+                </a:solidFill>
+                <a:latin typeface="Arial" panose="020B0604020202020204" pitchFamily="34" charset="0"/>
+                <a:cs typeface="Arial" panose="020B0604020202020204" pitchFamily="34" charset="0"/>
+              </a:rPr>
+              <a:t>RE</a:t>
             </a:r>
           </a:p>
         </p:txBody>

</xml_diff>